<commit_message>
Polished version of Lexical Analysis Progress Update
</commit_message>
<xml_diff>
--- a/Documents/ProgressUpdate_Lexical+Analysis.pptx
+++ b/Documents/ProgressUpdate_Lexical+Analysis.pptx
@@ -194,7 +194,7 @@
           <a:p>
             <a:fld id="{E90B032E-E9D0-6E4D-A5D9-08440E203C1A}" type="datetimeFigureOut">
               <a:rPr lang="en-US" smtClean="0"/>
-              <a:t>4/30/2013</a:t>
+              <a:t>13. 4. 30.</a:t>
             </a:fld>
             <a:endParaRPr lang="en-US"/>
           </a:p>
@@ -506,123 +506,6 @@
           <a:bodyPr/>
           <a:lstStyle/>
           <a:p>
-            <a:r>
-              <a:rPr lang="ko-KR" altLang="en-US" dirty="0" smtClean="0"/>
-              <a:t>수정내용</a:t>
-            </a:r>
-            <a:endParaRPr lang="en-US" altLang="ko-KR" dirty="0" smtClean="0"/>
-          </a:p>
-          <a:p>
-            <a:pPr marL="171450" indent="-171450">
-              <a:buFontTx/>
-              <a:buChar char="-"/>
-            </a:pPr>
-            <a:r>
-              <a:rPr lang="ko-KR" altLang="en-US" dirty="0" smtClean="0"/>
-              <a:t>주요 단어는 대문자로 시작하도록</a:t>
-            </a:r>
-            <a:endParaRPr lang="en-US" altLang="ko-KR" dirty="0" smtClean="0"/>
-          </a:p>
-          <a:p>
-            <a:pPr marL="171450" indent="-171450">
-              <a:buFontTx/>
-              <a:buChar char="-"/>
-            </a:pPr>
-            <a:r>
-              <a:rPr lang="ko-KR" altLang="en-US" dirty="0" smtClean="0"/>
-              <a:t>다이어그램 색상 적용</a:t>
-            </a:r>
-            <a:r>
-              <a:rPr lang="en-US" altLang="ko-KR" dirty="0" smtClean="0"/>
-              <a:t>:</a:t>
-            </a:r>
-            <a:r>
-              <a:rPr lang="ko-KR" altLang="en-US" dirty="0" smtClean="0"/>
-              <a:t> 녹색 </a:t>
-            </a:r>
-            <a:r>
-              <a:rPr lang="en-US" altLang="ko-KR" dirty="0" smtClean="0"/>
-              <a:t>–</a:t>
-            </a:r>
-            <a:r>
-              <a:rPr lang="ko-KR" altLang="en-US" dirty="0" smtClean="0"/>
-              <a:t> 완료</a:t>
-            </a:r>
-            <a:r>
-              <a:rPr lang="en-US" altLang="ko-KR" dirty="0" smtClean="0"/>
-              <a:t>,</a:t>
-            </a:r>
-            <a:r>
-              <a:rPr lang="ko-KR" altLang="en-US" dirty="0" smtClean="0"/>
-              <a:t> 회색 </a:t>
-            </a:r>
-            <a:r>
-              <a:rPr lang="en-US" altLang="ko-KR" dirty="0" smtClean="0"/>
-              <a:t>–</a:t>
-            </a:r>
-            <a:r>
-              <a:rPr lang="ko-KR" altLang="en-US" dirty="0" smtClean="0"/>
-              <a:t> 진행예정</a:t>
-            </a:r>
-            <a:r>
-              <a:rPr lang="en-US" altLang="ko-KR" dirty="0" smtClean="0"/>
-              <a:t>,</a:t>
-            </a:r>
-            <a:r>
-              <a:rPr lang="ko-KR" altLang="en-US" dirty="0" smtClean="0"/>
-              <a:t> 주황색 </a:t>
-            </a:r>
-            <a:r>
-              <a:rPr lang="en-US" altLang="ko-KR" dirty="0" smtClean="0"/>
-              <a:t>–</a:t>
-            </a:r>
-            <a:r>
-              <a:rPr lang="ko-KR" altLang="en-US" dirty="0" smtClean="0"/>
-              <a:t> 진행중</a:t>
-            </a:r>
-            <a:endParaRPr lang="en-US" altLang="ko-KR" dirty="0" smtClean="0"/>
-          </a:p>
-          <a:p>
-            <a:pPr marL="171450" indent="-171450">
-              <a:buFontTx/>
-              <a:buChar char="-"/>
-            </a:pPr>
-            <a:r>
-              <a:rPr lang="ko-KR" altLang="en-US" dirty="0" smtClean="0"/>
-              <a:t>텍스트 색상 적용</a:t>
-            </a:r>
-            <a:r>
-              <a:rPr lang="en-US" altLang="ko-KR" dirty="0" smtClean="0"/>
-              <a:t>:</a:t>
-            </a:r>
-            <a:r>
-              <a:rPr lang="ko-KR" altLang="en-US" dirty="0" smtClean="0"/>
-              <a:t> 회색 </a:t>
-            </a:r>
-            <a:r>
-              <a:rPr lang="en-US" altLang="ko-KR" dirty="0" smtClean="0"/>
-              <a:t>–</a:t>
-            </a:r>
-            <a:r>
-              <a:rPr lang="ko-KR" altLang="en-US" dirty="0" smtClean="0"/>
-              <a:t> 완료</a:t>
-            </a:r>
-            <a:r>
-              <a:rPr lang="en-US" altLang="ko-KR" dirty="0" smtClean="0"/>
-              <a:t>,</a:t>
-            </a:r>
-            <a:r>
-              <a:rPr lang="ko-KR" altLang="en-US" dirty="0" smtClean="0"/>
-              <a:t> 검은색 </a:t>
-            </a:r>
-            <a:r>
-              <a:rPr lang="en-US" altLang="ko-KR" dirty="0" smtClean="0"/>
-              <a:t>-</a:t>
-            </a:r>
-            <a:r>
-              <a:rPr lang="ko-KR" altLang="en-US" dirty="0" smtClean="0"/>
-              <a:t> 미완료</a:t>
-            </a:r>
             <a:endParaRPr lang="en-US" dirty="0"/>
           </a:p>
         </p:txBody>
@@ -844,7 +727,7 @@
           <a:p>
             <a:fld id="{647CE973-C3FA-4582-BB10-A5F13AFEF8BF}" type="datetimeFigureOut">
               <a:rPr lang="ko-KR" altLang="en-US" smtClean="0"/>
-              <a:t>2013-04-30</a:t>
+              <a:t>13. 4. 30.</a:t>
             </a:fld>
             <a:endParaRPr lang="ko-KR" altLang="en-US"/>
           </a:p>
@@ -1014,7 +897,7 @@
           <a:p>
             <a:fld id="{647CE973-C3FA-4582-BB10-A5F13AFEF8BF}" type="datetimeFigureOut">
               <a:rPr lang="ko-KR" altLang="en-US" smtClean="0"/>
-              <a:t>2013-04-30</a:t>
+              <a:t>13. 4. 30.</a:t>
             </a:fld>
             <a:endParaRPr lang="ko-KR" altLang="en-US"/>
           </a:p>
@@ -1194,7 +1077,7 @@
           <a:p>
             <a:fld id="{647CE973-C3FA-4582-BB10-A5F13AFEF8BF}" type="datetimeFigureOut">
               <a:rPr lang="ko-KR" altLang="en-US" smtClean="0"/>
-              <a:t>2013-04-30</a:t>
+              <a:t>13. 4. 30.</a:t>
             </a:fld>
             <a:endParaRPr lang="ko-KR" altLang="en-US"/>
           </a:p>
@@ -1364,7 +1247,7 @@
           <a:p>
             <a:fld id="{647CE973-C3FA-4582-BB10-A5F13AFEF8BF}" type="datetimeFigureOut">
               <a:rPr lang="ko-KR" altLang="en-US" smtClean="0"/>
-              <a:t>2013-04-30</a:t>
+              <a:t>13. 4. 30.</a:t>
             </a:fld>
             <a:endParaRPr lang="ko-KR" altLang="en-US"/>
           </a:p>
@@ -1610,7 +1493,7 @@
           <a:p>
             <a:fld id="{647CE973-C3FA-4582-BB10-A5F13AFEF8BF}" type="datetimeFigureOut">
               <a:rPr lang="ko-KR" altLang="en-US" smtClean="0"/>
-              <a:t>2013-04-30</a:t>
+              <a:t>13. 4. 30.</a:t>
             </a:fld>
             <a:endParaRPr lang="ko-KR" altLang="en-US"/>
           </a:p>
@@ -1898,7 +1781,7 @@
           <a:p>
             <a:fld id="{647CE973-C3FA-4582-BB10-A5F13AFEF8BF}" type="datetimeFigureOut">
               <a:rPr lang="ko-KR" altLang="en-US" smtClean="0"/>
-              <a:t>2013-04-30</a:t>
+              <a:t>13. 4. 30.</a:t>
             </a:fld>
             <a:endParaRPr lang="ko-KR" altLang="en-US"/>
           </a:p>
@@ -2320,7 +2203,7 @@
           <a:p>
             <a:fld id="{647CE973-C3FA-4582-BB10-A5F13AFEF8BF}" type="datetimeFigureOut">
               <a:rPr lang="ko-KR" altLang="en-US" smtClean="0"/>
-              <a:t>2013-04-30</a:t>
+              <a:t>13. 4. 30.</a:t>
             </a:fld>
             <a:endParaRPr lang="ko-KR" altLang="en-US"/>
           </a:p>
@@ -2438,7 +2321,7 @@
           <a:p>
             <a:fld id="{647CE973-C3FA-4582-BB10-A5F13AFEF8BF}" type="datetimeFigureOut">
               <a:rPr lang="ko-KR" altLang="en-US" smtClean="0"/>
-              <a:t>2013-04-30</a:t>
+              <a:t>13. 4. 30.</a:t>
             </a:fld>
             <a:endParaRPr lang="ko-KR" altLang="en-US"/>
           </a:p>
@@ -2533,7 +2416,7 @@
           <a:p>
             <a:fld id="{647CE973-C3FA-4582-BB10-A5F13AFEF8BF}" type="datetimeFigureOut">
               <a:rPr lang="ko-KR" altLang="en-US" smtClean="0"/>
-              <a:t>2013-04-30</a:t>
+              <a:t>13. 4. 30.</a:t>
             </a:fld>
             <a:endParaRPr lang="ko-KR" altLang="en-US"/>
           </a:p>
@@ -2810,7 +2693,7 @@
           <a:p>
             <a:fld id="{647CE973-C3FA-4582-BB10-A5F13AFEF8BF}" type="datetimeFigureOut">
               <a:rPr lang="ko-KR" altLang="en-US" smtClean="0"/>
-              <a:t>2013-04-30</a:t>
+              <a:t>13. 4. 30.</a:t>
             </a:fld>
             <a:endParaRPr lang="ko-KR" altLang="en-US"/>
           </a:p>
@@ -3063,7 +2946,7 @@
           <a:p>
             <a:fld id="{647CE973-C3FA-4582-BB10-A5F13AFEF8BF}" type="datetimeFigureOut">
               <a:rPr lang="ko-KR" altLang="en-US" smtClean="0"/>
-              <a:t>2013-04-30</a:t>
+              <a:t>13. 4. 30.</a:t>
             </a:fld>
             <a:endParaRPr lang="ko-KR" altLang="en-US"/>
           </a:p>
@@ -3276,7 +3159,7 @@
           <a:p>
             <a:fld id="{647CE973-C3FA-4582-BB10-A5F13AFEF8BF}" type="datetimeFigureOut">
               <a:rPr lang="ko-KR" altLang="en-US" smtClean="0"/>
-              <a:t>2013-04-30</a:t>
+              <a:t>13. 4. 30.</a:t>
             </a:fld>
             <a:endParaRPr lang="ko-KR" altLang="en-US"/>
           </a:p>
@@ -3964,8 +3847,9 @@
             <a:pPr lvl="1"/>
             <a:r>
               <a:rPr lang="en-US" altLang="ko-KR" dirty="0" smtClean="0"/>
-              <a:t>To Do</a:t>
-            </a:r>
+              <a:t>Planned</a:t>
+            </a:r>
+            <a:endParaRPr lang="en-US" altLang="ko-KR" dirty="0" smtClean="0"/>
           </a:p>
           <a:p>
             <a:pPr lvl="2"/>
@@ -4442,8 +4326,9 @@
             <a:pPr lvl="1"/>
             <a:r>
               <a:rPr lang="en-US" altLang="ko-KR" dirty="0" smtClean="0"/>
-              <a:t>To Do</a:t>
-            </a:r>
+              <a:t>Planned</a:t>
+            </a:r>
+            <a:endParaRPr lang="en-US" altLang="ko-KR" dirty="0" smtClean="0"/>
           </a:p>
           <a:p>
             <a:pPr lvl="2"/>
@@ -4802,14 +4687,37 @@
         <p:spPr/>
         <p:txBody>
           <a:bodyPr>
-            <a:normAutofit fontScale="92500" lnSpcReduction="20000"/>
+            <a:normAutofit fontScale="85000" lnSpcReduction="20000"/>
           </a:bodyPr>
           <a:lstStyle/>
           <a:p>
             <a:r>
               <a:rPr lang="en-US" dirty="0" smtClean="0"/>
-              <a:t>To Do</a:t>
-            </a:r>
+              <a:t>Done</a:t>
+            </a:r>
+          </a:p>
+          <a:p>
+            <a:pPr lvl="1"/>
+            <a:r>
+              <a:rPr lang="en-US" dirty="0"/>
+              <a:t>Control </a:t>
+            </a:r>
+            <a:r>
+              <a:rPr lang="en-US" dirty="0" smtClean="0"/>
+              <a:t>Flow </a:t>
+            </a:r>
+            <a:r>
+              <a:rPr lang="ko-KR" altLang="en-US" dirty="0" smtClean="0"/>
+              <a:t>정리</a:t>
+            </a:r>
+            <a:endParaRPr lang="en-US" dirty="0" smtClean="0"/>
+          </a:p>
+          <a:p>
+            <a:r>
+              <a:rPr lang="en-US" dirty="0" smtClean="0"/>
+              <a:t>Planned</a:t>
+            </a:r>
+            <a:endParaRPr lang="en-US" dirty="0" smtClean="0"/>
           </a:p>
           <a:p>
             <a:pPr lvl="1"/>
@@ -4821,40 +4729,55 @@
           <a:p>
             <a:pPr lvl="2"/>
             <a:r>
-              <a:rPr lang="en-US" dirty="0" smtClean="0"/>
-              <a:t>Control flow </a:t>
+              <a:rPr lang="en-US" altLang="ko-KR" dirty="0" smtClean="0"/>
+              <a:t>Trainer </a:t>
             </a:r>
             <a:r>
               <a:rPr lang="ko-KR" altLang="en-US" dirty="0" smtClean="0"/>
-              <a:t>정리</a:t>
+              <a:t>실행환경 설계</a:t>
+            </a:r>
+            <a:r>
+              <a:rPr lang="en-US" altLang="ko-KR" dirty="0" smtClean="0"/>
+              <a:t> </a:t>
+            </a:r>
+            <a:r>
+              <a:rPr lang="ko-KR" altLang="en-US" dirty="0" smtClean="0"/>
+              <a:t>검증</a:t>
             </a:r>
             <a:endParaRPr lang="en-US" altLang="ko-KR" dirty="0" smtClean="0"/>
           </a:p>
           <a:p>
             <a:pPr lvl="2"/>
             <a:r>
-              <a:rPr lang="en-US" dirty="0" smtClean="0"/>
-              <a:t>Training Data Format </a:t>
+              <a:rPr lang="en-US" altLang="ko-KR" dirty="0" smtClean="0"/>
+              <a:t>Module Integration </a:t>
             </a:r>
             <a:r>
               <a:rPr lang="ko-KR" altLang="en-US" dirty="0" smtClean="0"/>
-              <a:t>정의</a:t>
-            </a:r>
-            <a:r>
-              <a:rPr lang="en-US" dirty="0" smtClean="0"/>
-              <a:t> </a:t>
+              <a:t>설계</a:t>
+            </a:r>
+            <a:r>
+              <a:rPr lang="en-US" altLang="ko-KR" dirty="0" smtClean="0"/>
+              <a:t> (Interconnection)</a:t>
+            </a:r>
+          </a:p>
+          <a:p>
+            <a:pPr lvl="2"/>
+            <a:r>
+              <a:rPr lang="en-US" altLang="ko-KR" dirty="0"/>
+              <a:t>Finding Possible Parallelization </a:t>
+            </a:r>
+            <a:r>
+              <a:rPr lang="en-US" altLang="ko-KR" dirty="0" smtClean="0"/>
+              <a:t>Point</a:t>
             </a:r>
             <a:endParaRPr lang="en-US" altLang="ko-KR" dirty="0" smtClean="0"/>
           </a:p>
           <a:p>
-            <a:pPr lvl="2"/>
+            <a:pPr lvl="1"/>
             <a:r>
               <a:rPr lang="en-US" altLang="ko-KR" dirty="0" smtClean="0"/>
-              <a:t>Output Structure </a:t>
-            </a:r>
-            <a:r>
-              <a:rPr lang="ko-KR" altLang="en-US" dirty="0" smtClean="0"/>
-              <a:t>정의</a:t>
+              <a:t>Implementation</a:t>
             </a:r>
             <a:endParaRPr lang="en-US" altLang="ko-KR" dirty="0" smtClean="0"/>
           </a:p>
@@ -4866,25 +4789,6 @@
             </a:r>
             <a:r>
               <a:rPr lang="ko-KR" altLang="en-US" dirty="0" smtClean="0"/>
-              <a:t>설계</a:t>
-            </a:r>
-            <a:endParaRPr lang="en-US" altLang="ko-KR" dirty="0" smtClean="0"/>
-          </a:p>
-          <a:p>
-            <a:pPr lvl="1"/>
-            <a:r>
-              <a:rPr lang="en-US" altLang="ko-KR" dirty="0" smtClean="0"/>
-              <a:t>Implementation</a:t>
-            </a:r>
-          </a:p>
-          <a:p>
-            <a:pPr lvl="2"/>
-            <a:r>
-              <a:rPr lang="en-US" altLang="ko-KR" dirty="0" smtClean="0"/>
-              <a:t>Integration </a:t>
-            </a:r>
-            <a:r>
-              <a:rPr lang="ko-KR" altLang="en-US" dirty="0" smtClean="0"/>
               <a:t>테스트</a:t>
             </a:r>
             <a:r>
@@ -4920,29 +4824,28 @@
             <a:pPr lvl="2"/>
             <a:r>
               <a:rPr lang="en-US" altLang="ko-KR" dirty="0" smtClean="0"/>
-              <a:t>Runtime Environment Design Verification</a:t>
+              <a:t>Runtime Environment Design </a:t>
+            </a:r>
+            <a:r>
+              <a:rPr lang="en-US" altLang="ko-KR" dirty="0" smtClean="0"/>
+              <a:t>Verification – Integration Phase</a:t>
+            </a:r>
+            <a:endParaRPr lang="en-US" altLang="ko-KR" dirty="0" smtClean="0"/>
+          </a:p>
+          <a:p>
+            <a:pPr lvl="1"/>
+            <a:r>
+              <a:rPr lang="en-US" altLang="ko-KR" dirty="0" smtClean="0"/>
+              <a:t>Finalization</a:t>
             </a:r>
           </a:p>
           <a:p>
             <a:pPr lvl="2"/>
             <a:r>
               <a:rPr lang="en-US" altLang="ko-KR" dirty="0" smtClean="0"/>
-              <a:t>Daemon Demo</a:t>
-            </a:r>
-          </a:p>
-          <a:p>
-            <a:pPr lvl="1"/>
-            <a:r>
-              <a:rPr lang="en-US" altLang="ko-KR" dirty="0" smtClean="0"/>
-              <a:t>Others</a:t>
-            </a:r>
-          </a:p>
-          <a:p>
-            <a:pPr lvl="2"/>
-            <a:r>
-              <a:rPr lang="en-US" altLang="ko-KR" dirty="0" smtClean="0"/>
-              <a:t>Finding Possible Parallelization Point</a:t>
-            </a:r>
+              <a:t>Test of Trainer Daemon with Real World Data Samples</a:t>
+            </a:r>
+            <a:endParaRPr lang="en-US" altLang="ko-KR" dirty="0" smtClean="0"/>
           </a:p>
           <a:p>
             <a:pPr lvl="2"/>

</xml_diff>